<commit_message>
started a powerpoint file
</commit_message>
<xml_diff>
--- a/wrims2_vscript/doc/Position Analysis with CalLite.pptx
+++ b/wrims2_vscript/doc/Position Analysis with CalLite.pptx
@@ -6,7 +6,8 @@
   </p:sldMasterIdLst>
   <p:sldIdLst>
     <p:sldId id="256" r:id="rId2"/>
-    <p:sldId id="257" r:id="rId3"/>
+    <p:sldId id="258" r:id="rId3"/>
+    <p:sldId id="257" r:id="rId4"/>
   </p:sldIdLst>
   <p:sldSz cx="9144000" cy="6858000" type="screen4x3"/>
   <p:notesSz cx="6858000" cy="9144000"/>
@@ -289,7 +290,7 @@
           <a:p>
             <a:fld id="{2C308518-5484-4D27-A27E-16604AEEC442}" type="datetimeFigureOut">
               <a:rPr lang="en-US" smtClean="0"/>
-              <a:t>7/12/2013</a:t>
+              <a:t>7/16/2013</a:t>
             </a:fld>
             <a:endParaRPr lang="en-US"/>
           </a:p>
@@ -459,7 +460,7 @@
           <a:p>
             <a:fld id="{2C308518-5484-4D27-A27E-16604AEEC442}" type="datetimeFigureOut">
               <a:rPr lang="en-US" smtClean="0"/>
-              <a:t>7/12/2013</a:t>
+              <a:t>7/16/2013</a:t>
             </a:fld>
             <a:endParaRPr lang="en-US"/>
           </a:p>
@@ -639,7 +640,7 @@
           <a:p>
             <a:fld id="{2C308518-5484-4D27-A27E-16604AEEC442}" type="datetimeFigureOut">
               <a:rPr lang="en-US" smtClean="0"/>
-              <a:t>7/12/2013</a:t>
+              <a:t>7/16/2013</a:t>
             </a:fld>
             <a:endParaRPr lang="en-US"/>
           </a:p>
@@ -809,7 +810,7 @@
           <a:p>
             <a:fld id="{2C308518-5484-4D27-A27E-16604AEEC442}" type="datetimeFigureOut">
               <a:rPr lang="en-US" smtClean="0"/>
-              <a:t>7/12/2013</a:t>
+              <a:t>7/16/2013</a:t>
             </a:fld>
             <a:endParaRPr lang="en-US"/>
           </a:p>
@@ -1055,7 +1056,7 @@
           <a:p>
             <a:fld id="{2C308518-5484-4D27-A27E-16604AEEC442}" type="datetimeFigureOut">
               <a:rPr lang="en-US" smtClean="0"/>
-              <a:t>7/12/2013</a:t>
+              <a:t>7/16/2013</a:t>
             </a:fld>
             <a:endParaRPr lang="en-US"/>
           </a:p>
@@ -1343,7 +1344,7 @@
           <a:p>
             <a:fld id="{2C308518-5484-4D27-A27E-16604AEEC442}" type="datetimeFigureOut">
               <a:rPr lang="en-US" smtClean="0"/>
-              <a:t>7/12/2013</a:t>
+              <a:t>7/16/2013</a:t>
             </a:fld>
             <a:endParaRPr lang="en-US"/>
           </a:p>
@@ -1765,7 +1766,7 @@
           <a:p>
             <a:fld id="{2C308518-5484-4D27-A27E-16604AEEC442}" type="datetimeFigureOut">
               <a:rPr lang="en-US" smtClean="0"/>
-              <a:t>7/12/2013</a:t>
+              <a:t>7/16/2013</a:t>
             </a:fld>
             <a:endParaRPr lang="en-US"/>
           </a:p>
@@ -1883,7 +1884,7 @@
           <a:p>
             <a:fld id="{2C308518-5484-4D27-A27E-16604AEEC442}" type="datetimeFigureOut">
               <a:rPr lang="en-US" smtClean="0"/>
-              <a:t>7/12/2013</a:t>
+              <a:t>7/16/2013</a:t>
             </a:fld>
             <a:endParaRPr lang="en-US"/>
           </a:p>
@@ -1978,7 +1979,7 @@
           <a:p>
             <a:fld id="{2C308518-5484-4D27-A27E-16604AEEC442}" type="datetimeFigureOut">
               <a:rPr lang="en-US" smtClean="0"/>
-              <a:t>7/12/2013</a:t>
+              <a:t>7/16/2013</a:t>
             </a:fld>
             <a:endParaRPr lang="en-US"/>
           </a:p>
@@ -2255,7 +2256,7 @@
           <a:p>
             <a:fld id="{2C308518-5484-4D27-A27E-16604AEEC442}" type="datetimeFigureOut">
               <a:rPr lang="en-US" smtClean="0"/>
-              <a:t>7/12/2013</a:t>
+              <a:t>7/16/2013</a:t>
             </a:fld>
             <a:endParaRPr lang="en-US"/>
           </a:p>
@@ -2508,7 +2509,7 @@
           <a:p>
             <a:fld id="{2C308518-5484-4D27-A27E-16604AEEC442}" type="datetimeFigureOut">
               <a:rPr lang="en-US" smtClean="0"/>
-              <a:t>7/12/2013</a:t>
+              <a:t>7/16/2013</a:t>
             </a:fld>
             <a:endParaRPr lang="en-US"/>
           </a:p>
@@ -2721,7 +2722,7 @@
           <a:p>
             <a:fld id="{2C308518-5484-4D27-A27E-16604AEEC442}" type="datetimeFigureOut">
               <a:rPr lang="en-US" smtClean="0"/>
-              <a:t>7/12/2013</a:t>
+              <a:t>7/16/2013</a:t>
             </a:fld>
             <a:endParaRPr lang="en-US"/>
           </a:p>
@@ -3184,6 +3185,1092 @@
         </p:nvSpPr>
         <p:spPr/>
         <p:txBody>
+          <a:bodyPr>
+            <a:normAutofit/>
+          </a:bodyPr>
+          <a:lstStyle/>
+          <a:p>
+            <a:r>
+              <a:rPr lang="en-US" sz="3600" dirty="0"/>
+              <a:t>Position Analysis with </a:t>
+            </a:r>
+            <a:r>
+              <a:rPr lang="en-US" sz="3600" dirty="0" err="1"/>
+              <a:t>CalLite</a:t>
+            </a:r>
+            <a:endParaRPr lang="en-US" sz="3600" dirty="0"/>
+          </a:p>
+        </p:txBody>
+      </p:sp>
+      <p:grpSp>
+        <p:nvGrpSpPr>
+          <p:cNvPr id="31" name="Group 30"/>
+          <p:cNvGrpSpPr/>
+          <p:nvPr/>
+        </p:nvGrpSpPr>
+        <p:grpSpPr>
+          <a:xfrm>
+            <a:off x="1066800" y="2286000"/>
+            <a:ext cx="7010400" cy="2743200"/>
+            <a:chOff x="1066800" y="2286000"/>
+            <a:chExt cx="7010400" cy="2743200"/>
+          </a:xfrm>
+        </p:grpSpPr>
+        <p:cxnSp>
+          <p:nvCxnSpPr>
+            <p:cNvPr id="27" name="Straight Connector 26"/>
+            <p:cNvCxnSpPr/>
+            <p:nvPr/>
+          </p:nvCxnSpPr>
+          <p:spPr>
+            <a:xfrm>
+              <a:off x="3733800" y="2286000"/>
+              <a:ext cx="0" cy="2743200"/>
+            </a:xfrm>
+            <a:prstGeom prst="line">
+              <a:avLst/>
+            </a:prstGeom>
+            <a:ln w="22225">
+              <a:solidFill>
+                <a:schemeClr val="accent1">
+                  <a:lumMod val="50000"/>
+                </a:schemeClr>
+              </a:solidFill>
+              <a:prstDash val="sysDash"/>
+            </a:ln>
+          </p:spPr>
+          <p:style>
+            <a:lnRef idx="1">
+              <a:schemeClr val="accent1"/>
+            </a:lnRef>
+            <a:fillRef idx="0">
+              <a:schemeClr val="accent1"/>
+            </a:fillRef>
+            <a:effectRef idx="0">
+              <a:schemeClr val="accent1"/>
+            </a:effectRef>
+            <a:fontRef idx="minor">
+              <a:schemeClr val="tx1"/>
+            </a:fontRef>
+          </p:style>
+        </p:cxnSp>
+        <p:sp>
+          <p:nvSpPr>
+            <p:cNvPr id="4" name="Rectangle 3"/>
+            <p:cNvSpPr/>
+            <p:nvPr/>
+          </p:nvSpPr>
+          <p:spPr>
+            <a:xfrm>
+              <a:off x="3124200" y="3124200"/>
+              <a:ext cx="609600" cy="990600"/>
+            </a:xfrm>
+            <a:prstGeom prst="rect">
+              <a:avLst/>
+            </a:prstGeom>
+          </p:spPr>
+          <p:style>
+            <a:lnRef idx="2">
+              <a:schemeClr val="accent1">
+                <a:shade val="50000"/>
+              </a:schemeClr>
+            </a:lnRef>
+            <a:fillRef idx="1">
+              <a:schemeClr val="accent1"/>
+            </a:fillRef>
+            <a:effectRef idx="0">
+              <a:schemeClr val="accent1"/>
+            </a:effectRef>
+            <a:fontRef idx="minor">
+              <a:schemeClr val="lt1"/>
+            </a:fontRef>
+          </p:style>
+          <p:txBody>
+            <a:bodyPr rtlCol="0" anchor="ctr"/>
+            <a:lstStyle/>
+            <a:p>
+              <a:pPr algn="ctr"/>
+              <a:r>
+                <a:rPr lang="en-US" dirty="0" smtClean="0">
+                  <a:latin typeface="Consolas" pitchFamily="49" charset="0"/>
+                  <a:cs typeface="Consolas" pitchFamily="49" charset="0"/>
+                </a:rPr>
+                <a:t>SEP</a:t>
+              </a:r>
+              <a:endParaRPr lang="en-US" dirty="0">
+                <a:latin typeface="Consolas" pitchFamily="49" charset="0"/>
+                <a:cs typeface="Consolas" pitchFamily="49" charset="0"/>
+              </a:endParaRPr>
+            </a:p>
+          </p:txBody>
+        </p:sp>
+        <p:sp>
+          <p:nvSpPr>
+            <p:cNvPr id="5" name="Rectangle 4"/>
+            <p:cNvSpPr/>
+            <p:nvPr/>
+          </p:nvSpPr>
+          <p:spPr>
+            <a:xfrm>
+              <a:off x="2514600" y="3124200"/>
+              <a:ext cx="609600" cy="990600"/>
+            </a:xfrm>
+            <a:prstGeom prst="rect">
+              <a:avLst/>
+            </a:prstGeom>
+          </p:spPr>
+          <p:style>
+            <a:lnRef idx="2">
+              <a:schemeClr val="accent1">
+                <a:shade val="50000"/>
+              </a:schemeClr>
+            </a:lnRef>
+            <a:fillRef idx="1">
+              <a:schemeClr val="accent1"/>
+            </a:fillRef>
+            <a:effectRef idx="0">
+              <a:schemeClr val="accent1"/>
+            </a:effectRef>
+            <a:fontRef idx="minor">
+              <a:schemeClr val="lt1"/>
+            </a:fontRef>
+          </p:style>
+          <p:txBody>
+            <a:bodyPr rtlCol="0" anchor="ctr"/>
+            <a:lstStyle/>
+            <a:p>
+              <a:pPr algn="ctr"/>
+              <a:r>
+                <a:rPr lang="en-US" dirty="0" smtClean="0">
+                  <a:latin typeface="Consolas" pitchFamily="49" charset="0"/>
+                  <a:cs typeface="Consolas" pitchFamily="49" charset="0"/>
+                </a:rPr>
+                <a:t>AUG</a:t>
+              </a:r>
+              <a:endParaRPr lang="en-US" dirty="0">
+                <a:latin typeface="Consolas" pitchFamily="49" charset="0"/>
+                <a:cs typeface="Consolas" pitchFamily="49" charset="0"/>
+              </a:endParaRPr>
+            </a:p>
+          </p:txBody>
+        </p:sp>
+        <p:sp>
+          <p:nvSpPr>
+            <p:cNvPr id="8" name="Rectangle 7"/>
+            <p:cNvSpPr/>
+            <p:nvPr/>
+          </p:nvSpPr>
+          <p:spPr>
+            <a:xfrm>
+              <a:off x="1905000" y="3124200"/>
+              <a:ext cx="609600" cy="990600"/>
+            </a:xfrm>
+            <a:prstGeom prst="rect">
+              <a:avLst/>
+            </a:prstGeom>
+          </p:spPr>
+          <p:style>
+            <a:lnRef idx="2">
+              <a:schemeClr val="accent1">
+                <a:shade val="50000"/>
+              </a:schemeClr>
+            </a:lnRef>
+            <a:fillRef idx="1">
+              <a:schemeClr val="accent1"/>
+            </a:fillRef>
+            <a:effectRef idx="0">
+              <a:schemeClr val="accent1"/>
+            </a:effectRef>
+            <a:fontRef idx="minor">
+              <a:schemeClr val="lt1"/>
+            </a:fontRef>
+          </p:style>
+          <p:txBody>
+            <a:bodyPr rtlCol="0" anchor="ctr"/>
+            <a:lstStyle/>
+            <a:p>
+              <a:pPr algn="ctr"/>
+              <a:r>
+                <a:rPr lang="en-US" dirty="0" smtClean="0">
+                  <a:latin typeface="Consolas" pitchFamily="49" charset="0"/>
+                  <a:cs typeface="Consolas" pitchFamily="49" charset="0"/>
+                </a:rPr>
+                <a:t>JUL</a:t>
+              </a:r>
+              <a:endParaRPr lang="en-US" dirty="0">
+                <a:latin typeface="Consolas" pitchFamily="49" charset="0"/>
+                <a:cs typeface="Consolas" pitchFamily="49" charset="0"/>
+              </a:endParaRPr>
+            </a:p>
+          </p:txBody>
+        </p:sp>
+        <p:sp>
+          <p:nvSpPr>
+            <p:cNvPr id="9" name="Rectangle 8"/>
+            <p:cNvSpPr/>
+            <p:nvPr/>
+          </p:nvSpPr>
+          <p:spPr>
+            <a:xfrm>
+              <a:off x="1295400" y="3124200"/>
+              <a:ext cx="609600" cy="990600"/>
+            </a:xfrm>
+            <a:prstGeom prst="rect">
+              <a:avLst/>
+            </a:prstGeom>
+            <a:gradFill flip="none" rotWithShape="1">
+              <a:gsLst>
+                <a:gs pos="0">
+                  <a:schemeClr val="tx2">
+                    <a:lumMod val="20000"/>
+                    <a:lumOff val="80000"/>
+                  </a:schemeClr>
+                </a:gs>
+                <a:gs pos="100000">
+                  <a:schemeClr val="tx2">
+                    <a:lumMod val="60000"/>
+                    <a:lumOff val="40000"/>
+                  </a:schemeClr>
+                </a:gs>
+                <a:gs pos="100000">
+                  <a:schemeClr val="accent1">
+                    <a:tint val="23500"/>
+                    <a:satMod val="160000"/>
+                  </a:schemeClr>
+                </a:gs>
+              </a:gsLst>
+              <a:lin ang="0" scaled="1"/>
+              <a:tileRect/>
+            </a:gradFill>
+            <a:ln>
+              <a:gradFill flip="none" rotWithShape="1">
+                <a:gsLst>
+                  <a:gs pos="0">
+                    <a:schemeClr val="tx2">
+                      <a:lumMod val="40000"/>
+                      <a:lumOff val="60000"/>
+                    </a:schemeClr>
+                  </a:gs>
+                  <a:gs pos="50000">
+                    <a:schemeClr val="tx2">
+                      <a:lumMod val="60000"/>
+                      <a:lumOff val="40000"/>
+                    </a:schemeClr>
+                  </a:gs>
+                  <a:gs pos="100000">
+                    <a:schemeClr val="accent1">
+                      <a:lumMod val="75000"/>
+                    </a:schemeClr>
+                  </a:gs>
+                </a:gsLst>
+                <a:lin ang="0" scaled="1"/>
+                <a:tileRect/>
+              </a:gradFill>
+            </a:ln>
+          </p:spPr>
+          <p:style>
+            <a:lnRef idx="2">
+              <a:schemeClr val="accent1">
+                <a:shade val="50000"/>
+              </a:schemeClr>
+            </a:lnRef>
+            <a:fillRef idx="1">
+              <a:schemeClr val="accent1"/>
+            </a:fillRef>
+            <a:effectRef idx="0">
+              <a:schemeClr val="accent1"/>
+            </a:effectRef>
+            <a:fontRef idx="minor">
+              <a:schemeClr val="lt1"/>
+            </a:fontRef>
+          </p:style>
+          <p:txBody>
+            <a:bodyPr rtlCol="0" anchor="ctr"/>
+            <a:lstStyle/>
+            <a:p>
+              <a:pPr algn="ctr"/>
+              <a:r>
+                <a:rPr lang="en-US" dirty="0" smtClean="0">
+                  <a:latin typeface="Consolas" pitchFamily="49" charset="0"/>
+                  <a:cs typeface="Consolas" pitchFamily="49" charset="0"/>
+                </a:rPr>
+                <a:t>JUN</a:t>
+              </a:r>
+              <a:endParaRPr lang="en-US" dirty="0">
+                <a:latin typeface="Consolas" pitchFamily="49" charset="0"/>
+                <a:cs typeface="Consolas" pitchFamily="49" charset="0"/>
+              </a:endParaRPr>
+            </a:p>
+          </p:txBody>
+        </p:sp>
+        <p:sp>
+          <p:nvSpPr>
+            <p:cNvPr id="11" name="Rectangle 10"/>
+            <p:cNvSpPr/>
+            <p:nvPr/>
+          </p:nvSpPr>
+          <p:spPr>
+            <a:xfrm>
+              <a:off x="3733800" y="3124200"/>
+              <a:ext cx="609600" cy="990600"/>
+            </a:xfrm>
+            <a:prstGeom prst="rect">
+              <a:avLst/>
+            </a:prstGeom>
+            <a:solidFill>
+              <a:schemeClr val="accent2">
+                <a:lumMod val="75000"/>
+              </a:schemeClr>
+            </a:solidFill>
+            <a:ln>
+              <a:solidFill>
+                <a:schemeClr val="accent2">
+                  <a:lumMod val="50000"/>
+                </a:schemeClr>
+              </a:solidFill>
+            </a:ln>
+          </p:spPr>
+          <p:style>
+            <a:lnRef idx="2">
+              <a:schemeClr val="accent1">
+                <a:shade val="50000"/>
+              </a:schemeClr>
+            </a:lnRef>
+            <a:fillRef idx="1">
+              <a:schemeClr val="accent1"/>
+            </a:fillRef>
+            <a:effectRef idx="0">
+              <a:schemeClr val="accent1"/>
+            </a:effectRef>
+            <a:fontRef idx="minor">
+              <a:schemeClr val="lt1"/>
+            </a:fontRef>
+          </p:style>
+          <p:txBody>
+            <a:bodyPr rtlCol="0" anchor="ctr"/>
+            <a:lstStyle/>
+            <a:p>
+              <a:pPr algn="ctr"/>
+              <a:r>
+                <a:rPr lang="en-US" dirty="0" smtClean="0">
+                  <a:latin typeface="Consolas" pitchFamily="49" charset="0"/>
+                  <a:cs typeface="Consolas" pitchFamily="49" charset="0"/>
+                </a:rPr>
+                <a:t>OCT</a:t>
+              </a:r>
+              <a:endParaRPr lang="en-US" dirty="0">
+                <a:latin typeface="Consolas" pitchFamily="49" charset="0"/>
+                <a:cs typeface="Consolas" pitchFamily="49" charset="0"/>
+              </a:endParaRPr>
+            </a:p>
+          </p:txBody>
+        </p:sp>
+        <p:sp>
+          <p:nvSpPr>
+            <p:cNvPr id="12" name="Rectangle 11"/>
+            <p:cNvSpPr/>
+            <p:nvPr/>
+          </p:nvSpPr>
+          <p:spPr>
+            <a:xfrm>
+              <a:off x="4343400" y="3124200"/>
+              <a:ext cx="609600" cy="990600"/>
+            </a:xfrm>
+            <a:prstGeom prst="rect">
+              <a:avLst/>
+            </a:prstGeom>
+            <a:solidFill>
+              <a:schemeClr val="accent2">
+                <a:lumMod val="75000"/>
+              </a:schemeClr>
+            </a:solidFill>
+            <a:ln>
+              <a:solidFill>
+                <a:schemeClr val="accent2">
+                  <a:lumMod val="50000"/>
+                </a:schemeClr>
+              </a:solidFill>
+            </a:ln>
+          </p:spPr>
+          <p:style>
+            <a:lnRef idx="2">
+              <a:schemeClr val="accent1">
+                <a:shade val="50000"/>
+              </a:schemeClr>
+            </a:lnRef>
+            <a:fillRef idx="1">
+              <a:schemeClr val="accent1"/>
+            </a:fillRef>
+            <a:effectRef idx="0">
+              <a:schemeClr val="accent1"/>
+            </a:effectRef>
+            <a:fontRef idx="minor">
+              <a:schemeClr val="lt1"/>
+            </a:fontRef>
+          </p:style>
+          <p:txBody>
+            <a:bodyPr rtlCol="0" anchor="ctr"/>
+            <a:lstStyle/>
+            <a:p>
+              <a:pPr algn="ctr"/>
+              <a:r>
+                <a:rPr lang="en-US" dirty="0" smtClean="0">
+                  <a:latin typeface="Consolas" pitchFamily="49" charset="0"/>
+                  <a:cs typeface="Consolas" pitchFamily="49" charset="0"/>
+                </a:rPr>
+                <a:t>NOV</a:t>
+              </a:r>
+              <a:endParaRPr lang="en-US" dirty="0">
+                <a:latin typeface="Consolas" pitchFamily="49" charset="0"/>
+                <a:cs typeface="Consolas" pitchFamily="49" charset="0"/>
+              </a:endParaRPr>
+            </a:p>
+          </p:txBody>
+        </p:sp>
+        <p:sp>
+          <p:nvSpPr>
+            <p:cNvPr id="13" name="Rectangle 12"/>
+            <p:cNvSpPr/>
+            <p:nvPr/>
+          </p:nvSpPr>
+          <p:spPr>
+            <a:xfrm>
+              <a:off x="4953000" y="3124200"/>
+              <a:ext cx="609600" cy="990600"/>
+            </a:xfrm>
+            <a:prstGeom prst="rect">
+              <a:avLst/>
+            </a:prstGeom>
+            <a:solidFill>
+              <a:schemeClr val="accent2">
+                <a:lumMod val="75000"/>
+              </a:schemeClr>
+            </a:solidFill>
+            <a:ln>
+              <a:solidFill>
+                <a:schemeClr val="accent2">
+                  <a:lumMod val="50000"/>
+                </a:schemeClr>
+              </a:solidFill>
+            </a:ln>
+          </p:spPr>
+          <p:style>
+            <a:lnRef idx="2">
+              <a:schemeClr val="accent1">
+                <a:shade val="50000"/>
+              </a:schemeClr>
+            </a:lnRef>
+            <a:fillRef idx="1">
+              <a:schemeClr val="accent1"/>
+            </a:fillRef>
+            <a:effectRef idx="0">
+              <a:schemeClr val="accent1"/>
+            </a:effectRef>
+            <a:fontRef idx="minor">
+              <a:schemeClr val="lt1"/>
+            </a:fontRef>
+          </p:style>
+          <p:txBody>
+            <a:bodyPr rtlCol="0" anchor="ctr"/>
+            <a:lstStyle/>
+            <a:p>
+              <a:pPr algn="ctr"/>
+              <a:r>
+                <a:rPr lang="en-US" dirty="0" smtClean="0">
+                  <a:latin typeface="Consolas" pitchFamily="49" charset="0"/>
+                  <a:cs typeface="Consolas" pitchFamily="49" charset="0"/>
+                </a:rPr>
+                <a:t>DEC</a:t>
+              </a:r>
+              <a:endParaRPr lang="en-US" dirty="0">
+                <a:latin typeface="Consolas" pitchFamily="49" charset="0"/>
+                <a:cs typeface="Consolas" pitchFamily="49" charset="0"/>
+              </a:endParaRPr>
+            </a:p>
+          </p:txBody>
+        </p:sp>
+        <p:sp>
+          <p:nvSpPr>
+            <p:cNvPr id="14" name="Rectangle 13"/>
+            <p:cNvSpPr/>
+            <p:nvPr/>
+          </p:nvSpPr>
+          <p:spPr>
+            <a:xfrm>
+              <a:off x="5562600" y="3124200"/>
+              <a:ext cx="609600" cy="990600"/>
+            </a:xfrm>
+            <a:prstGeom prst="rect">
+              <a:avLst/>
+            </a:prstGeom>
+            <a:solidFill>
+              <a:schemeClr val="accent2">
+                <a:lumMod val="75000"/>
+              </a:schemeClr>
+            </a:solidFill>
+            <a:ln>
+              <a:solidFill>
+                <a:schemeClr val="accent2">
+                  <a:lumMod val="50000"/>
+                </a:schemeClr>
+              </a:solidFill>
+            </a:ln>
+          </p:spPr>
+          <p:style>
+            <a:lnRef idx="2">
+              <a:schemeClr val="accent1">
+                <a:shade val="50000"/>
+              </a:schemeClr>
+            </a:lnRef>
+            <a:fillRef idx="1">
+              <a:schemeClr val="accent1"/>
+            </a:fillRef>
+            <a:effectRef idx="0">
+              <a:schemeClr val="accent1"/>
+            </a:effectRef>
+            <a:fontRef idx="minor">
+              <a:schemeClr val="lt1"/>
+            </a:fontRef>
+          </p:style>
+          <p:txBody>
+            <a:bodyPr rtlCol="0" anchor="ctr"/>
+            <a:lstStyle/>
+            <a:p>
+              <a:pPr algn="ctr"/>
+              <a:r>
+                <a:rPr lang="en-US" dirty="0" smtClean="0">
+                  <a:latin typeface="Consolas" pitchFamily="49" charset="0"/>
+                  <a:cs typeface="Consolas" pitchFamily="49" charset="0"/>
+                </a:rPr>
+                <a:t>JAN</a:t>
+              </a:r>
+              <a:endParaRPr lang="en-US" dirty="0">
+                <a:latin typeface="Consolas" pitchFamily="49" charset="0"/>
+                <a:cs typeface="Consolas" pitchFamily="49" charset="0"/>
+              </a:endParaRPr>
+            </a:p>
+          </p:txBody>
+        </p:sp>
+        <p:sp>
+          <p:nvSpPr>
+            <p:cNvPr id="15" name="Rectangle 14"/>
+            <p:cNvSpPr/>
+            <p:nvPr/>
+          </p:nvSpPr>
+          <p:spPr>
+            <a:xfrm>
+              <a:off x="6172200" y="3124200"/>
+              <a:ext cx="609600" cy="990600"/>
+            </a:xfrm>
+            <a:prstGeom prst="rect">
+              <a:avLst/>
+            </a:prstGeom>
+            <a:solidFill>
+              <a:schemeClr val="accent2">
+                <a:lumMod val="75000"/>
+              </a:schemeClr>
+            </a:solidFill>
+            <a:ln>
+              <a:solidFill>
+                <a:schemeClr val="accent2">
+                  <a:lumMod val="50000"/>
+                </a:schemeClr>
+              </a:solidFill>
+            </a:ln>
+          </p:spPr>
+          <p:style>
+            <a:lnRef idx="2">
+              <a:schemeClr val="accent1">
+                <a:shade val="50000"/>
+              </a:schemeClr>
+            </a:lnRef>
+            <a:fillRef idx="1">
+              <a:schemeClr val="accent1"/>
+            </a:fillRef>
+            <a:effectRef idx="0">
+              <a:schemeClr val="accent1"/>
+            </a:effectRef>
+            <a:fontRef idx="minor">
+              <a:schemeClr val="lt1"/>
+            </a:fontRef>
+          </p:style>
+          <p:txBody>
+            <a:bodyPr rtlCol="0" anchor="ctr"/>
+            <a:lstStyle/>
+            <a:p>
+              <a:pPr algn="ctr"/>
+              <a:r>
+                <a:rPr lang="en-US" dirty="0" smtClean="0">
+                  <a:latin typeface="Consolas" pitchFamily="49" charset="0"/>
+                  <a:cs typeface="Consolas" pitchFamily="49" charset="0"/>
+                </a:rPr>
+                <a:t>FEB</a:t>
+              </a:r>
+              <a:endParaRPr lang="en-US" dirty="0">
+                <a:latin typeface="Consolas" pitchFamily="49" charset="0"/>
+                <a:cs typeface="Consolas" pitchFamily="49" charset="0"/>
+              </a:endParaRPr>
+            </a:p>
+          </p:txBody>
+        </p:sp>
+        <p:sp>
+          <p:nvSpPr>
+            <p:cNvPr id="16" name="Rectangle 15"/>
+            <p:cNvSpPr/>
+            <p:nvPr/>
+          </p:nvSpPr>
+          <p:spPr>
+            <a:xfrm>
+              <a:off x="7391400" y="3124200"/>
+              <a:ext cx="609600" cy="990600"/>
+            </a:xfrm>
+            <a:prstGeom prst="rect">
+              <a:avLst/>
+            </a:prstGeom>
+            <a:gradFill flip="none" rotWithShape="1">
+              <a:gsLst>
+                <a:gs pos="0">
+                  <a:schemeClr val="accent2">
+                    <a:lumMod val="75000"/>
+                  </a:schemeClr>
+                </a:gs>
+                <a:gs pos="100000">
+                  <a:schemeClr val="accent2">
+                    <a:lumMod val="40000"/>
+                    <a:lumOff val="60000"/>
+                  </a:schemeClr>
+                </a:gs>
+                <a:gs pos="100000">
+                  <a:schemeClr val="accent1">
+                    <a:tint val="23500"/>
+                    <a:satMod val="160000"/>
+                  </a:schemeClr>
+                </a:gs>
+              </a:gsLst>
+              <a:lin ang="0" scaled="1"/>
+              <a:tileRect/>
+            </a:gradFill>
+            <a:ln>
+              <a:gradFill flip="none" rotWithShape="1">
+                <a:gsLst>
+                  <a:gs pos="0">
+                    <a:schemeClr val="accent2">
+                      <a:lumMod val="50000"/>
+                    </a:schemeClr>
+                  </a:gs>
+                  <a:gs pos="50000">
+                    <a:schemeClr val="accent2">
+                      <a:lumMod val="75000"/>
+                    </a:schemeClr>
+                  </a:gs>
+                  <a:gs pos="100000">
+                    <a:schemeClr val="accent2">
+                      <a:lumMod val="60000"/>
+                      <a:lumOff val="40000"/>
+                    </a:schemeClr>
+                  </a:gs>
+                </a:gsLst>
+                <a:lin ang="0" scaled="1"/>
+                <a:tileRect/>
+              </a:gradFill>
+            </a:ln>
+          </p:spPr>
+          <p:style>
+            <a:lnRef idx="2">
+              <a:schemeClr val="accent1">
+                <a:shade val="50000"/>
+              </a:schemeClr>
+            </a:lnRef>
+            <a:fillRef idx="1">
+              <a:schemeClr val="accent1"/>
+            </a:fillRef>
+            <a:effectRef idx="0">
+              <a:schemeClr val="accent1"/>
+            </a:effectRef>
+            <a:fontRef idx="minor">
+              <a:schemeClr val="lt1"/>
+            </a:fontRef>
+          </p:style>
+          <p:txBody>
+            <a:bodyPr rtlCol="0" anchor="ctr"/>
+            <a:lstStyle/>
+            <a:p>
+              <a:pPr algn="ctr"/>
+              <a:r>
+                <a:rPr lang="en-US" dirty="0" smtClean="0">
+                  <a:latin typeface="Consolas" pitchFamily="49" charset="0"/>
+                  <a:cs typeface="Consolas" pitchFamily="49" charset="0"/>
+                </a:rPr>
+                <a:t>APR</a:t>
+              </a:r>
+              <a:endParaRPr lang="en-US" dirty="0">
+                <a:latin typeface="Consolas" pitchFamily="49" charset="0"/>
+                <a:cs typeface="Consolas" pitchFamily="49" charset="0"/>
+              </a:endParaRPr>
+            </a:p>
+          </p:txBody>
+        </p:sp>
+        <p:sp>
+          <p:nvSpPr>
+            <p:cNvPr id="22" name="Rectangle 21"/>
+            <p:cNvSpPr/>
+            <p:nvPr/>
+          </p:nvSpPr>
+          <p:spPr>
+            <a:xfrm>
+              <a:off x="1752600" y="2368670"/>
+              <a:ext cx="1600200" cy="533400"/>
+            </a:xfrm>
+            <a:prstGeom prst="rect">
+              <a:avLst/>
+            </a:prstGeom>
+            <a:noFill/>
+            <a:ln>
+              <a:noFill/>
+            </a:ln>
+          </p:spPr>
+          <p:style>
+            <a:lnRef idx="2">
+              <a:schemeClr val="accent1">
+                <a:shade val="50000"/>
+              </a:schemeClr>
+            </a:lnRef>
+            <a:fillRef idx="1">
+              <a:schemeClr val="accent1"/>
+            </a:fillRef>
+            <a:effectRef idx="0">
+              <a:schemeClr val="accent1"/>
+            </a:effectRef>
+            <a:fontRef idx="minor">
+              <a:schemeClr val="lt1"/>
+            </a:fontRef>
+          </p:style>
+          <p:txBody>
+            <a:bodyPr rtlCol="0" anchor="ctr"/>
+            <a:lstStyle/>
+            <a:p>
+              <a:pPr algn="ctr"/>
+              <a:r>
+                <a:rPr lang="en-US" sz="2400" b="1" dirty="0" smtClean="0">
+                  <a:solidFill>
+                    <a:schemeClr val="tx2">
+                      <a:lumMod val="75000"/>
+                    </a:schemeClr>
+                  </a:solidFill>
+                  <a:latin typeface="Consolas" pitchFamily="49" charset="0"/>
+                  <a:cs typeface="Consolas" pitchFamily="49" charset="0"/>
+                </a:rPr>
+                <a:t>2012 WY</a:t>
+              </a:r>
+              <a:endParaRPr lang="en-US" sz="2400" b="1" dirty="0">
+                <a:solidFill>
+                  <a:schemeClr val="tx2">
+                    <a:lumMod val="75000"/>
+                  </a:schemeClr>
+                </a:solidFill>
+                <a:latin typeface="Consolas" pitchFamily="49" charset="0"/>
+                <a:cs typeface="Consolas" pitchFamily="49" charset="0"/>
+              </a:endParaRPr>
+            </a:p>
+          </p:txBody>
+        </p:sp>
+        <p:sp>
+          <p:nvSpPr>
+            <p:cNvPr id="23" name="Rectangle 22"/>
+            <p:cNvSpPr/>
+            <p:nvPr/>
+          </p:nvSpPr>
+          <p:spPr>
+            <a:xfrm>
+              <a:off x="4648200" y="2368670"/>
+              <a:ext cx="1600200" cy="533400"/>
+            </a:xfrm>
+            <a:prstGeom prst="rect">
+              <a:avLst/>
+            </a:prstGeom>
+            <a:noFill/>
+            <a:ln>
+              <a:noFill/>
+            </a:ln>
+          </p:spPr>
+          <p:style>
+            <a:lnRef idx="2">
+              <a:schemeClr val="accent1">
+                <a:shade val="50000"/>
+              </a:schemeClr>
+            </a:lnRef>
+            <a:fillRef idx="1">
+              <a:schemeClr val="accent1"/>
+            </a:fillRef>
+            <a:effectRef idx="0">
+              <a:schemeClr val="accent1"/>
+            </a:effectRef>
+            <a:fontRef idx="minor">
+              <a:schemeClr val="lt1"/>
+            </a:fontRef>
+          </p:style>
+          <p:txBody>
+            <a:bodyPr rtlCol="0" anchor="ctr"/>
+            <a:lstStyle/>
+            <a:p>
+              <a:pPr algn="ctr"/>
+              <a:r>
+                <a:rPr lang="en-US" sz="2400" b="1" dirty="0" smtClean="0">
+                  <a:solidFill>
+                    <a:schemeClr val="tx2">
+                      <a:lumMod val="75000"/>
+                    </a:schemeClr>
+                  </a:solidFill>
+                  <a:latin typeface="Consolas" pitchFamily="49" charset="0"/>
+                  <a:cs typeface="Consolas" pitchFamily="49" charset="0"/>
+                </a:rPr>
+                <a:t>2013 WY</a:t>
+              </a:r>
+              <a:endParaRPr lang="en-US" sz="2400" b="1" dirty="0">
+                <a:solidFill>
+                  <a:schemeClr val="tx2">
+                    <a:lumMod val="75000"/>
+                  </a:schemeClr>
+                </a:solidFill>
+                <a:latin typeface="Consolas" pitchFamily="49" charset="0"/>
+                <a:cs typeface="Consolas" pitchFamily="49" charset="0"/>
+              </a:endParaRPr>
+            </a:p>
+          </p:txBody>
+        </p:sp>
+        <p:sp>
+          <p:nvSpPr>
+            <p:cNvPr id="25" name="Rectangle 24"/>
+            <p:cNvSpPr/>
+            <p:nvPr/>
+          </p:nvSpPr>
+          <p:spPr>
+            <a:xfrm>
+              <a:off x="1066800" y="4343400"/>
+              <a:ext cx="2590800" cy="533400"/>
+            </a:xfrm>
+            <a:prstGeom prst="rect">
+              <a:avLst/>
+            </a:prstGeom>
+            <a:noFill/>
+            <a:ln>
+              <a:noFill/>
+            </a:ln>
+          </p:spPr>
+          <p:style>
+            <a:lnRef idx="2">
+              <a:schemeClr val="accent1">
+                <a:shade val="50000"/>
+              </a:schemeClr>
+            </a:lnRef>
+            <a:fillRef idx="1">
+              <a:schemeClr val="accent1"/>
+            </a:fillRef>
+            <a:effectRef idx="0">
+              <a:schemeClr val="accent1"/>
+            </a:effectRef>
+            <a:fontRef idx="minor">
+              <a:schemeClr val="lt1"/>
+            </a:fontRef>
+          </p:style>
+          <p:txBody>
+            <a:bodyPr rtlCol="0" anchor="ctr"/>
+            <a:lstStyle/>
+            <a:p>
+              <a:pPr algn="ctr"/>
+              <a:r>
+                <a:rPr lang="en-US" sz="2000" b="1" dirty="0" smtClean="0">
+                  <a:solidFill>
+                    <a:schemeClr val="tx2">
+                      <a:lumMod val="75000"/>
+                    </a:schemeClr>
+                  </a:solidFill>
+                  <a:latin typeface="Consolas" pitchFamily="49" charset="0"/>
+                  <a:cs typeface="Consolas" pitchFamily="49" charset="0"/>
+                </a:rPr>
+                <a:t>Observed Data</a:t>
+              </a:r>
+              <a:endParaRPr lang="en-US" sz="2000" b="1" dirty="0">
+                <a:solidFill>
+                  <a:schemeClr val="tx2">
+                    <a:lumMod val="75000"/>
+                  </a:schemeClr>
+                </a:solidFill>
+                <a:latin typeface="Consolas" pitchFamily="49" charset="0"/>
+                <a:cs typeface="Consolas" pitchFamily="49" charset="0"/>
+              </a:endParaRPr>
+            </a:p>
+          </p:txBody>
+        </p:sp>
+        <p:sp>
+          <p:nvSpPr>
+            <p:cNvPr id="28" name="Rectangle 27"/>
+            <p:cNvSpPr/>
+            <p:nvPr/>
+          </p:nvSpPr>
+          <p:spPr>
+            <a:xfrm>
+              <a:off x="3738112" y="4352026"/>
+              <a:ext cx="4339088" cy="533400"/>
+            </a:xfrm>
+            <a:prstGeom prst="rect">
+              <a:avLst/>
+            </a:prstGeom>
+            <a:noFill/>
+            <a:ln>
+              <a:noFill/>
+            </a:ln>
+          </p:spPr>
+          <p:style>
+            <a:lnRef idx="2">
+              <a:schemeClr val="accent1">
+                <a:shade val="50000"/>
+              </a:schemeClr>
+            </a:lnRef>
+            <a:fillRef idx="1">
+              <a:schemeClr val="accent1"/>
+            </a:fillRef>
+            <a:effectRef idx="0">
+              <a:schemeClr val="accent1"/>
+            </a:effectRef>
+            <a:fontRef idx="minor">
+              <a:schemeClr val="lt1"/>
+            </a:fontRef>
+          </p:style>
+          <p:txBody>
+            <a:bodyPr rtlCol="0" anchor="ctr"/>
+            <a:lstStyle/>
+            <a:p>
+              <a:pPr algn="ctr"/>
+              <a:r>
+                <a:rPr lang="en-US" sz="2000" b="1" dirty="0" smtClean="0">
+                  <a:solidFill>
+                    <a:schemeClr val="tx2">
+                      <a:lumMod val="75000"/>
+                    </a:schemeClr>
+                  </a:solidFill>
+                  <a:latin typeface="Consolas" pitchFamily="49" charset="0"/>
+                  <a:cs typeface="Consolas" pitchFamily="49" charset="0"/>
+                </a:rPr>
+                <a:t>Simulated/Forecasted Data</a:t>
+              </a:r>
+              <a:endParaRPr lang="en-US" sz="2000" b="1" dirty="0">
+                <a:solidFill>
+                  <a:schemeClr val="tx2">
+                    <a:lumMod val="75000"/>
+                  </a:schemeClr>
+                </a:solidFill>
+                <a:latin typeface="Consolas" pitchFamily="49" charset="0"/>
+                <a:cs typeface="Consolas" pitchFamily="49" charset="0"/>
+              </a:endParaRPr>
+            </a:p>
+          </p:txBody>
+        </p:sp>
+        <p:sp>
+          <p:nvSpPr>
+            <p:cNvPr id="29" name="Rectangle 28"/>
+            <p:cNvSpPr/>
+            <p:nvPr/>
+          </p:nvSpPr>
+          <p:spPr>
+            <a:xfrm>
+              <a:off x="6781800" y="3124200"/>
+              <a:ext cx="609600" cy="990600"/>
+            </a:xfrm>
+            <a:prstGeom prst="rect">
+              <a:avLst/>
+            </a:prstGeom>
+            <a:solidFill>
+              <a:schemeClr val="accent2">
+                <a:lumMod val="75000"/>
+              </a:schemeClr>
+            </a:solidFill>
+            <a:ln>
+              <a:solidFill>
+                <a:schemeClr val="accent2">
+                  <a:lumMod val="50000"/>
+                </a:schemeClr>
+              </a:solidFill>
+            </a:ln>
+          </p:spPr>
+          <p:style>
+            <a:lnRef idx="2">
+              <a:schemeClr val="accent1">
+                <a:shade val="50000"/>
+              </a:schemeClr>
+            </a:lnRef>
+            <a:fillRef idx="1">
+              <a:schemeClr val="accent1"/>
+            </a:fillRef>
+            <a:effectRef idx="0">
+              <a:schemeClr val="accent1"/>
+            </a:effectRef>
+            <a:fontRef idx="minor">
+              <a:schemeClr val="lt1"/>
+            </a:fontRef>
+          </p:style>
+          <p:txBody>
+            <a:bodyPr rtlCol="0" anchor="ctr"/>
+            <a:lstStyle/>
+            <a:p>
+              <a:pPr algn="ctr"/>
+              <a:r>
+                <a:rPr lang="en-US" dirty="0" smtClean="0">
+                  <a:latin typeface="Consolas" pitchFamily="49" charset="0"/>
+                  <a:cs typeface="Consolas" pitchFamily="49" charset="0"/>
+                </a:rPr>
+                <a:t>MAR</a:t>
+              </a:r>
+              <a:endParaRPr lang="en-US" dirty="0">
+                <a:latin typeface="Consolas" pitchFamily="49" charset="0"/>
+                <a:cs typeface="Consolas" pitchFamily="49" charset="0"/>
+              </a:endParaRPr>
+            </a:p>
+          </p:txBody>
+        </p:sp>
+      </p:grpSp>
+    </p:spTree>
+    <p:extLst>
+      <p:ext uri="{BB962C8B-B14F-4D97-AF65-F5344CB8AC3E}">
+        <p14:creationId xmlns:p14="http://schemas.microsoft.com/office/powerpoint/2010/main" val="2531501347"/>
+      </p:ext>
+    </p:extLst>
+  </p:cSld>
+  <p:clrMapOvr>
+    <a:masterClrMapping/>
+  </p:clrMapOvr>
+</p:sld>
+</file>
+
+<file path=ppt/slides/slide3.xml><?xml version="1.0" encoding="utf-8"?>
+<p:sld xmlns:a="http://schemas.openxmlformats.org/drawingml/2006/main" xmlns:r="http://schemas.openxmlformats.org/officeDocument/2006/relationships" xmlns:p="http://schemas.openxmlformats.org/presentationml/2006/main">
+  <p:cSld>
+    <p:spTree>
+      <p:nvGrpSpPr>
+        <p:cNvPr id="1" name=""/>
+        <p:cNvGrpSpPr/>
+        <p:nvPr/>
+      </p:nvGrpSpPr>
+      <p:grpSpPr>
+        <a:xfrm>
+          <a:off x="0" y="0"/>
+          <a:ext cx="0" cy="0"/>
+          <a:chOff x="0" y="0"/>
+          <a:chExt cx="0" cy="0"/>
+        </a:xfrm>
+      </p:grpSpPr>
+      <p:sp>
+        <p:nvSpPr>
+          <p:cNvPr id="2" name="Title 1"/>
+          <p:cNvSpPr>
+            <a:spLocks noGrp="1"/>
+          </p:cNvSpPr>
+          <p:nvPr>
+            <p:ph type="title"/>
+          </p:nvPr>
+        </p:nvSpPr>
+        <p:spPr/>
+        <p:txBody>
           <a:bodyPr/>
           <a:lstStyle/>
           <a:p>
@@ -3203,10 +4290,84 @@
         </p:nvSpPr>
         <p:spPr/>
         <p:txBody>
-          <a:bodyPr/>
-          <a:lstStyle/>
-          <a:p>
-            <a:endParaRPr lang="en-US"/>
+          <a:bodyPr>
+            <a:normAutofit fontScale="92500"/>
+          </a:bodyPr>
+          <a:lstStyle/>
+          <a:p>
+            <a:r>
+              <a:rPr lang="en-US" sz="2800" dirty="0" smtClean="0"/>
+              <a:t>Step </a:t>
+            </a:r>
+            <a:r>
+              <a:rPr lang="en-US" sz="2800" dirty="0"/>
+              <a:t>1. Provide initial data for decision variables. See .\Run\DSS\CL_INIT_2012.</a:t>
+            </a:r>
+            <a:r>
+              <a:rPr lang="en-US" sz="2800" u="sng" dirty="0"/>
+              <a:t>dss</a:t>
+            </a:r>
+          </a:p>
+          <a:p>
+            <a:r>
+              <a:rPr lang="en-US" sz="2800" dirty="0" smtClean="0"/>
+              <a:t>Step </a:t>
+            </a:r>
+            <a:r>
+              <a:rPr lang="en-US" sz="2800" dirty="0"/>
+              <a:t>2. Provide 2012 annual requests data in this table: \Run\Lookup\PA_Base_D1641_Existing\</a:t>
+            </a:r>
+            <a:r>
+              <a:rPr lang="en-US" sz="2800" dirty="0" err="1"/>
+              <a:t>AnnualReqDel_swp.table</a:t>
+            </a:r>
+            <a:endParaRPr lang="en-US" sz="2800" dirty="0"/>
+          </a:p>
+          <a:p>
+            <a:r>
+              <a:rPr lang="en-US" sz="2800" dirty="0" smtClean="0"/>
+              <a:t>Step </a:t>
+            </a:r>
+            <a:r>
+              <a:rPr lang="en-US" sz="2800" dirty="0"/>
+              <a:t>3. Enter data in the following "User Input" section</a:t>
+            </a:r>
+          </a:p>
+          <a:p>
+            <a:r>
+              <a:rPr lang="en-US" sz="2800" dirty="0" smtClean="0"/>
+              <a:t>Step </a:t>
+            </a:r>
+            <a:r>
+              <a:rPr lang="en-US" sz="2800" dirty="0"/>
+              <a:t>4. Open a command prompt and type </a:t>
+            </a:r>
+            <a:r>
+              <a:rPr lang="en-US" sz="2800" dirty="0"/>
+              <a:t>"</a:t>
+            </a:r>
+            <a:r>
+              <a:rPr lang="en-US" sz="2800" dirty="0" err="1"/>
+              <a:t>vscript</a:t>
+            </a:r>
+            <a:r>
+              <a:rPr lang="en-US" sz="2800" dirty="0"/>
+              <a:t> example_positionAnalysis.py"</a:t>
+            </a:r>
+            <a:endParaRPr lang="en-US" sz="2800" u="sng" dirty="0"/>
+          </a:p>
+          <a:p>
+            <a:r>
+              <a:rPr lang="en-US" sz="2800" dirty="0" smtClean="0"/>
+              <a:t>Step </a:t>
+            </a:r>
+            <a:r>
+              <a:rPr lang="en-US" sz="2800" dirty="0"/>
+              <a:t>5. A batch file named "CalLitePA_demo.bat" will be generated. Double click this batch file to run the project.</a:t>
+            </a:r>
+          </a:p>
+          <a:p>
+            <a:endParaRPr lang="en-US" dirty="0"/>
           </a:p>
         </p:txBody>
       </p:sp>

</xml_diff>